<commit_message>
Added new documents for previous sprints
</commit_message>
<xml_diff>
--- a/Docs/PRESENTATION_SPRINT_1.pptx
+++ b/Docs/PRESENTATION_SPRINT_1.pptx
@@ -8,7 +8,6 @@
     <p:sldId id="256" r:id="rId2"/>
     <p:sldId id="257" r:id="rId3"/>
     <p:sldId id="258" r:id="rId4"/>
-    <p:sldId id="259" r:id="rId5"/>
   </p:sldIdLst>
   <p:sldSz cx="9144000" cy="6858000" type="screen4x3"/>
   <p:notesSz cx="6858000" cy="9144000"/>
@@ -291,6 +290,7 @@
           <a:p>
             <a:fld id="{DFFEC6BA-A1B7-45A9-A497-036820647F43}" type="datetimeFigureOut">
               <a:rPr lang="pt-BR" smtClean="0"/>
+              <a:pPr/>
               <a:t>20/06/2014</a:t>
             </a:fld>
             <a:endParaRPr lang="pt-BR"/>
@@ -333,6 +333,7 @@
           <a:p>
             <a:fld id="{2E994A1B-9EC8-443E-AB50-093F978C17CC}" type="slidenum">
               <a:rPr lang="pt-BR" smtClean="0"/>
+              <a:pPr/>
               <a:t>‹nº›</a:t>
             </a:fld>
             <a:endParaRPr lang="pt-BR"/>
@@ -456,6 +457,7 @@
           <a:p>
             <a:fld id="{DFFEC6BA-A1B7-45A9-A497-036820647F43}" type="datetimeFigureOut">
               <a:rPr lang="pt-BR" smtClean="0"/>
+              <a:pPr/>
               <a:t>20/06/2014</a:t>
             </a:fld>
             <a:endParaRPr lang="pt-BR"/>
@@ -498,6 +500,7 @@
           <a:p>
             <a:fld id="{2E994A1B-9EC8-443E-AB50-093F978C17CC}" type="slidenum">
               <a:rPr lang="pt-BR" smtClean="0"/>
+              <a:pPr/>
               <a:t>‹nº›</a:t>
             </a:fld>
             <a:endParaRPr lang="pt-BR"/>
@@ -631,6 +634,7 @@
           <a:p>
             <a:fld id="{DFFEC6BA-A1B7-45A9-A497-036820647F43}" type="datetimeFigureOut">
               <a:rPr lang="pt-BR" smtClean="0"/>
+              <a:pPr/>
               <a:t>20/06/2014</a:t>
             </a:fld>
             <a:endParaRPr lang="pt-BR"/>
@@ -673,6 +677,7 @@
           <a:p>
             <a:fld id="{2E994A1B-9EC8-443E-AB50-093F978C17CC}" type="slidenum">
               <a:rPr lang="pt-BR" smtClean="0"/>
+              <a:pPr/>
               <a:t>‹nº›</a:t>
             </a:fld>
             <a:endParaRPr lang="pt-BR"/>
@@ -796,6 +801,7 @@
           <a:p>
             <a:fld id="{DFFEC6BA-A1B7-45A9-A497-036820647F43}" type="datetimeFigureOut">
               <a:rPr lang="pt-BR" smtClean="0"/>
+              <a:pPr/>
               <a:t>20/06/2014</a:t>
             </a:fld>
             <a:endParaRPr lang="pt-BR"/>
@@ -838,6 +844,7 @@
           <a:p>
             <a:fld id="{2E994A1B-9EC8-443E-AB50-093F978C17CC}" type="slidenum">
               <a:rPr lang="pt-BR" smtClean="0"/>
+              <a:pPr/>
               <a:t>‹nº›</a:t>
             </a:fld>
             <a:endParaRPr lang="pt-BR"/>
@@ -1037,6 +1044,7 @@
           <a:p>
             <a:fld id="{DFFEC6BA-A1B7-45A9-A497-036820647F43}" type="datetimeFigureOut">
               <a:rPr lang="pt-BR" smtClean="0"/>
+              <a:pPr/>
               <a:t>20/06/2014</a:t>
             </a:fld>
             <a:endParaRPr lang="pt-BR"/>
@@ -1079,6 +1087,7 @@
           <a:p>
             <a:fld id="{2E994A1B-9EC8-443E-AB50-093F978C17CC}" type="slidenum">
               <a:rPr lang="pt-BR" smtClean="0"/>
+              <a:pPr/>
               <a:t>‹nº›</a:t>
             </a:fld>
             <a:endParaRPr lang="pt-BR"/>
@@ -1320,6 +1329,7 @@
           <a:p>
             <a:fld id="{DFFEC6BA-A1B7-45A9-A497-036820647F43}" type="datetimeFigureOut">
               <a:rPr lang="pt-BR" smtClean="0"/>
+              <a:pPr/>
               <a:t>20/06/2014</a:t>
             </a:fld>
             <a:endParaRPr lang="pt-BR"/>
@@ -1362,6 +1372,7 @@
           <a:p>
             <a:fld id="{2E994A1B-9EC8-443E-AB50-093F978C17CC}" type="slidenum">
               <a:rPr lang="pt-BR" smtClean="0"/>
+              <a:pPr/>
               <a:t>‹nº›</a:t>
             </a:fld>
             <a:endParaRPr lang="pt-BR"/>
@@ -1737,6 +1748,7 @@
           <a:p>
             <a:fld id="{DFFEC6BA-A1B7-45A9-A497-036820647F43}" type="datetimeFigureOut">
               <a:rPr lang="pt-BR" smtClean="0"/>
+              <a:pPr/>
               <a:t>20/06/2014</a:t>
             </a:fld>
             <a:endParaRPr lang="pt-BR"/>
@@ -1779,6 +1791,7 @@
           <a:p>
             <a:fld id="{2E994A1B-9EC8-443E-AB50-093F978C17CC}" type="slidenum">
               <a:rPr lang="pt-BR" smtClean="0"/>
+              <a:pPr/>
               <a:t>‹nº›</a:t>
             </a:fld>
             <a:endParaRPr lang="pt-BR"/>
@@ -1850,6 +1863,7 @@
           <a:p>
             <a:fld id="{DFFEC6BA-A1B7-45A9-A497-036820647F43}" type="datetimeFigureOut">
               <a:rPr lang="pt-BR" smtClean="0"/>
+              <a:pPr/>
               <a:t>20/06/2014</a:t>
             </a:fld>
             <a:endParaRPr lang="pt-BR"/>
@@ -1892,6 +1906,7 @@
           <a:p>
             <a:fld id="{2E994A1B-9EC8-443E-AB50-093F978C17CC}" type="slidenum">
               <a:rPr lang="pt-BR" smtClean="0"/>
+              <a:pPr/>
               <a:t>‹nº›</a:t>
             </a:fld>
             <a:endParaRPr lang="pt-BR"/>
@@ -1940,6 +1955,7 @@
           <a:p>
             <a:fld id="{DFFEC6BA-A1B7-45A9-A497-036820647F43}" type="datetimeFigureOut">
               <a:rPr lang="pt-BR" smtClean="0"/>
+              <a:pPr/>
               <a:t>20/06/2014</a:t>
             </a:fld>
             <a:endParaRPr lang="pt-BR"/>
@@ -1982,6 +1998,7 @@
           <a:p>
             <a:fld id="{2E994A1B-9EC8-443E-AB50-093F978C17CC}" type="slidenum">
               <a:rPr lang="pt-BR" smtClean="0"/>
+              <a:pPr/>
               <a:t>‹nº›</a:t>
             </a:fld>
             <a:endParaRPr lang="pt-BR"/>
@@ -2212,6 +2229,7 @@
           <a:p>
             <a:fld id="{DFFEC6BA-A1B7-45A9-A497-036820647F43}" type="datetimeFigureOut">
               <a:rPr lang="pt-BR" smtClean="0"/>
+              <a:pPr/>
               <a:t>20/06/2014</a:t>
             </a:fld>
             <a:endParaRPr lang="pt-BR"/>
@@ -2254,6 +2272,7 @@
           <a:p>
             <a:fld id="{2E994A1B-9EC8-443E-AB50-093F978C17CC}" type="slidenum">
               <a:rPr lang="pt-BR" smtClean="0"/>
+              <a:pPr/>
               <a:t>‹nº›</a:t>
             </a:fld>
             <a:endParaRPr lang="pt-BR"/>
@@ -2460,6 +2479,7 @@
           <a:p>
             <a:fld id="{DFFEC6BA-A1B7-45A9-A497-036820647F43}" type="datetimeFigureOut">
               <a:rPr lang="pt-BR" smtClean="0"/>
+              <a:pPr/>
               <a:t>20/06/2014</a:t>
             </a:fld>
             <a:endParaRPr lang="pt-BR"/>
@@ -2502,6 +2522,7 @@
           <a:p>
             <a:fld id="{2E994A1B-9EC8-443E-AB50-093F978C17CC}" type="slidenum">
               <a:rPr lang="pt-BR" smtClean="0"/>
+              <a:pPr/>
               <a:t>‹nº›</a:t>
             </a:fld>
             <a:endParaRPr lang="pt-BR"/>
@@ -2668,6 +2689,7 @@
           <a:p>
             <a:fld id="{DFFEC6BA-A1B7-45A9-A497-036820647F43}" type="datetimeFigureOut">
               <a:rPr lang="pt-BR" smtClean="0"/>
+              <a:pPr/>
               <a:t>20/06/2014</a:t>
             </a:fld>
             <a:endParaRPr lang="pt-BR"/>
@@ -2746,6 +2768,7 @@
           <a:p>
             <a:fld id="{2E994A1B-9EC8-443E-AB50-093F978C17CC}" type="slidenum">
               <a:rPr lang="pt-BR" smtClean="0"/>
+              <a:pPr/>
               <a:t>‹nº›</a:t>
             </a:fld>
             <a:endParaRPr lang="pt-BR"/>
@@ -3551,11 +3574,7 @@
             </a:r>
             <a:r>
               <a:rPr lang="en-US" sz="1800" dirty="0" smtClean="0"/>
-              <a:t>nnecessary files </a:t>
-            </a:r>
-            <a:r>
-              <a:rPr lang="en-US" sz="1800" dirty="0" smtClean="0"/>
-              <a:t>were deleted from </a:t>
+              <a:t>nnecessary files were deleted from </a:t>
             </a:r>
             <a:r>
               <a:rPr lang="en-US" sz="1800" dirty="0"/>
@@ -3598,16 +3617,21 @@
           <a:p>
             <a:r>
               <a:rPr lang="en-US" sz="1800" dirty="0" smtClean="0"/>
-              <a:t>Investigation was made  on needed structures for correct work of persistent </a:t>
-            </a:r>
-            <a:r>
-              <a:rPr lang="en-US" sz="1800" dirty="0" err="1" smtClean="0"/>
-              <a:t>orthogonality</a:t>
+              <a:t>Investigation was made  on needed structures for correct work </a:t>
+            </a:r>
+            <a:r>
+              <a:rPr lang="en-US" sz="1800" dirty="0" smtClean="0"/>
+              <a:t>of </a:t>
+            </a:r>
+            <a:r>
+              <a:rPr lang="en-US" sz="1800" dirty="0" smtClean="0"/>
+              <a:t>orthogonal persistence</a:t>
             </a:r>
             <a:r>
               <a:rPr lang="en-US" sz="1800" dirty="0" smtClean="0"/>
               <a:t>.</a:t>
             </a:r>
+            <a:endParaRPr lang="en-US" sz="1800" dirty="0" smtClean="0"/>
           </a:p>
           <a:p>
             <a:endParaRPr lang="en-US" sz="1800" dirty="0"/>
@@ -3615,15 +3639,7 @@
           <a:p>
             <a:r>
               <a:rPr lang="en-US" sz="1800" dirty="0" smtClean="0"/>
-              <a:t>Unit tests were created for heap file and UTF-8 hash </a:t>
-            </a:r>
-            <a:r>
-              <a:rPr lang="en-US" sz="1800" smtClean="0"/>
-              <a:t>table file </a:t>
-            </a:r>
-            <a:r>
-              <a:rPr lang="en-US" sz="1800" dirty="0" smtClean="0"/>
-              <a:t>creation.</a:t>
+              <a:t>Unit tests were created for heap file and UTF-8 hash table file creation.</a:t>
             </a:r>
           </a:p>
           <a:p>
@@ -3634,69 +3650,6 @@
           </a:p>
           <a:p>
             <a:endParaRPr lang="pt-BR" dirty="0" smtClean="0"/>
-          </a:p>
-        </p:txBody>
-      </p:sp>
-    </p:spTree>
-  </p:cSld>
-  <p:clrMapOvr>
-    <a:masterClrMapping/>
-  </p:clrMapOvr>
-</p:sld>
-</file>
-
-<file path=ppt/slides/slide4.xml><?xml version="1.0" encoding="utf-8"?>
-<p:sld xmlns:a="http://schemas.openxmlformats.org/drawingml/2006/main" xmlns:r="http://schemas.openxmlformats.org/officeDocument/2006/relationships" xmlns:p="http://schemas.openxmlformats.org/presentationml/2006/main">
-  <p:cSld>
-    <p:spTree>
-      <p:nvGrpSpPr>
-        <p:cNvPr id="1" name=""/>
-        <p:cNvGrpSpPr/>
-        <p:nvPr/>
-      </p:nvGrpSpPr>
-      <p:grpSpPr>
-        <a:xfrm>
-          <a:off x="0" y="0"/>
-          <a:ext cx="0" cy="0"/>
-          <a:chOff x="0" y="0"/>
-          <a:chExt cx="0" cy="0"/>
-        </a:xfrm>
-      </p:grpSpPr>
-      <p:sp>
-        <p:nvSpPr>
-          <p:cNvPr id="2" name="Título 1"/>
-          <p:cNvSpPr>
-            <a:spLocks noGrp="1"/>
-          </p:cNvSpPr>
-          <p:nvPr>
-            <p:ph type="title"/>
-          </p:nvPr>
-        </p:nvSpPr>
-        <p:spPr/>
-        <p:txBody>
-          <a:bodyPr/>
-          <a:lstStyle/>
-          <a:p>
-            <a:endParaRPr lang="pt-BR" dirty="0"/>
-          </a:p>
-        </p:txBody>
-      </p:sp>
-      <p:sp>
-        <p:nvSpPr>
-          <p:cNvPr id="3" name="Espaço Reservado para Conteúdo 2"/>
-          <p:cNvSpPr>
-            <a:spLocks noGrp="1"/>
-          </p:cNvSpPr>
-          <p:nvPr>
-            <p:ph idx="1"/>
-          </p:nvPr>
-        </p:nvSpPr>
-        <p:spPr/>
-        <p:txBody>
-          <a:bodyPr/>
-          <a:lstStyle/>
-          <a:p>
-            <a:endParaRPr lang="pt-BR"/>
           </a:p>
         </p:txBody>
       </p:sp>

</xml_diff>

<commit_message>
Added documents from previous sprints
</commit_message>
<xml_diff>
--- a/Docs/PRESENTATION_SPRINT_1.pptx
+++ b/Docs/PRESENTATION_SPRINT_1.pptx
@@ -8,7 +8,6 @@
     <p:sldId id="256" r:id="rId2"/>
     <p:sldId id="257" r:id="rId3"/>
     <p:sldId id="258" r:id="rId4"/>
-    <p:sldId id="259" r:id="rId5"/>
   </p:sldIdLst>
   <p:sldSz cx="9144000" cy="6858000" type="screen4x3"/>
   <p:notesSz cx="6858000" cy="9144000"/>
@@ -291,6 +290,7 @@
           <a:p>
             <a:fld id="{DFFEC6BA-A1B7-45A9-A497-036820647F43}" type="datetimeFigureOut">
               <a:rPr lang="pt-BR" smtClean="0"/>
+              <a:pPr/>
               <a:t>20/06/2014</a:t>
             </a:fld>
             <a:endParaRPr lang="pt-BR"/>
@@ -333,6 +333,7 @@
           <a:p>
             <a:fld id="{2E994A1B-9EC8-443E-AB50-093F978C17CC}" type="slidenum">
               <a:rPr lang="pt-BR" smtClean="0"/>
+              <a:pPr/>
               <a:t>‹nº›</a:t>
             </a:fld>
             <a:endParaRPr lang="pt-BR"/>
@@ -456,6 +457,7 @@
           <a:p>
             <a:fld id="{DFFEC6BA-A1B7-45A9-A497-036820647F43}" type="datetimeFigureOut">
               <a:rPr lang="pt-BR" smtClean="0"/>
+              <a:pPr/>
               <a:t>20/06/2014</a:t>
             </a:fld>
             <a:endParaRPr lang="pt-BR"/>
@@ -498,6 +500,7 @@
           <a:p>
             <a:fld id="{2E994A1B-9EC8-443E-AB50-093F978C17CC}" type="slidenum">
               <a:rPr lang="pt-BR" smtClean="0"/>
+              <a:pPr/>
               <a:t>‹nº›</a:t>
             </a:fld>
             <a:endParaRPr lang="pt-BR"/>
@@ -631,6 +634,7 @@
           <a:p>
             <a:fld id="{DFFEC6BA-A1B7-45A9-A497-036820647F43}" type="datetimeFigureOut">
               <a:rPr lang="pt-BR" smtClean="0"/>
+              <a:pPr/>
               <a:t>20/06/2014</a:t>
             </a:fld>
             <a:endParaRPr lang="pt-BR"/>
@@ -673,6 +677,7 @@
           <a:p>
             <a:fld id="{2E994A1B-9EC8-443E-AB50-093F978C17CC}" type="slidenum">
               <a:rPr lang="pt-BR" smtClean="0"/>
+              <a:pPr/>
               <a:t>‹nº›</a:t>
             </a:fld>
             <a:endParaRPr lang="pt-BR"/>
@@ -796,6 +801,7 @@
           <a:p>
             <a:fld id="{DFFEC6BA-A1B7-45A9-A497-036820647F43}" type="datetimeFigureOut">
               <a:rPr lang="pt-BR" smtClean="0"/>
+              <a:pPr/>
               <a:t>20/06/2014</a:t>
             </a:fld>
             <a:endParaRPr lang="pt-BR"/>
@@ -838,6 +844,7 @@
           <a:p>
             <a:fld id="{2E994A1B-9EC8-443E-AB50-093F978C17CC}" type="slidenum">
               <a:rPr lang="pt-BR" smtClean="0"/>
+              <a:pPr/>
               <a:t>‹nº›</a:t>
             </a:fld>
             <a:endParaRPr lang="pt-BR"/>
@@ -1037,6 +1044,7 @@
           <a:p>
             <a:fld id="{DFFEC6BA-A1B7-45A9-A497-036820647F43}" type="datetimeFigureOut">
               <a:rPr lang="pt-BR" smtClean="0"/>
+              <a:pPr/>
               <a:t>20/06/2014</a:t>
             </a:fld>
             <a:endParaRPr lang="pt-BR"/>
@@ -1079,6 +1087,7 @@
           <a:p>
             <a:fld id="{2E994A1B-9EC8-443E-AB50-093F978C17CC}" type="slidenum">
               <a:rPr lang="pt-BR" smtClean="0"/>
+              <a:pPr/>
               <a:t>‹nº›</a:t>
             </a:fld>
             <a:endParaRPr lang="pt-BR"/>
@@ -1320,6 +1329,7 @@
           <a:p>
             <a:fld id="{DFFEC6BA-A1B7-45A9-A497-036820647F43}" type="datetimeFigureOut">
               <a:rPr lang="pt-BR" smtClean="0"/>
+              <a:pPr/>
               <a:t>20/06/2014</a:t>
             </a:fld>
             <a:endParaRPr lang="pt-BR"/>
@@ -1362,6 +1372,7 @@
           <a:p>
             <a:fld id="{2E994A1B-9EC8-443E-AB50-093F978C17CC}" type="slidenum">
               <a:rPr lang="pt-BR" smtClean="0"/>
+              <a:pPr/>
               <a:t>‹nº›</a:t>
             </a:fld>
             <a:endParaRPr lang="pt-BR"/>
@@ -1737,6 +1748,7 @@
           <a:p>
             <a:fld id="{DFFEC6BA-A1B7-45A9-A497-036820647F43}" type="datetimeFigureOut">
               <a:rPr lang="pt-BR" smtClean="0"/>
+              <a:pPr/>
               <a:t>20/06/2014</a:t>
             </a:fld>
             <a:endParaRPr lang="pt-BR"/>
@@ -1779,6 +1791,7 @@
           <a:p>
             <a:fld id="{2E994A1B-9EC8-443E-AB50-093F978C17CC}" type="slidenum">
               <a:rPr lang="pt-BR" smtClean="0"/>
+              <a:pPr/>
               <a:t>‹nº›</a:t>
             </a:fld>
             <a:endParaRPr lang="pt-BR"/>
@@ -1850,6 +1863,7 @@
           <a:p>
             <a:fld id="{DFFEC6BA-A1B7-45A9-A497-036820647F43}" type="datetimeFigureOut">
               <a:rPr lang="pt-BR" smtClean="0"/>
+              <a:pPr/>
               <a:t>20/06/2014</a:t>
             </a:fld>
             <a:endParaRPr lang="pt-BR"/>
@@ -1892,6 +1906,7 @@
           <a:p>
             <a:fld id="{2E994A1B-9EC8-443E-AB50-093F978C17CC}" type="slidenum">
               <a:rPr lang="pt-BR" smtClean="0"/>
+              <a:pPr/>
               <a:t>‹nº›</a:t>
             </a:fld>
             <a:endParaRPr lang="pt-BR"/>
@@ -1940,6 +1955,7 @@
           <a:p>
             <a:fld id="{DFFEC6BA-A1B7-45A9-A497-036820647F43}" type="datetimeFigureOut">
               <a:rPr lang="pt-BR" smtClean="0"/>
+              <a:pPr/>
               <a:t>20/06/2014</a:t>
             </a:fld>
             <a:endParaRPr lang="pt-BR"/>
@@ -1982,6 +1998,7 @@
           <a:p>
             <a:fld id="{2E994A1B-9EC8-443E-AB50-093F978C17CC}" type="slidenum">
               <a:rPr lang="pt-BR" smtClean="0"/>
+              <a:pPr/>
               <a:t>‹nº›</a:t>
             </a:fld>
             <a:endParaRPr lang="pt-BR"/>
@@ -2212,6 +2229,7 @@
           <a:p>
             <a:fld id="{DFFEC6BA-A1B7-45A9-A497-036820647F43}" type="datetimeFigureOut">
               <a:rPr lang="pt-BR" smtClean="0"/>
+              <a:pPr/>
               <a:t>20/06/2014</a:t>
             </a:fld>
             <a:endParaRPr lang="pt-BR"/>
@@ -2254,6 +2272,7 @@
           <a:p>
             <a:fld id="{2E994A1B-9EC8-443E-AB50-093F978C17CC}" type="slidenum">
               <a:rPr lang="pt-BR" smtClean="0"/>
+              <a:pPr/>
               <a:t>‹nº›</a:t>
             </a:fld>
             <a:endParaRPr lang="pt-BR"/>
@@ -2460,6 +2479,7 @@
           <a:p>
             <a:fld id="{DFFEC6BA-A1B7-45A9-A497-036820647F43}" type="datetimeFigureOut">
               <a:rPr lang="pt-BR" smtClean="0"/>
+              <a:pPr/>
               <a:t>20/06/2014</a:t>
             </a:fld>
             <a:endParaRPr lang="pt-BR"/>
@@ -2502,6 +2522,7 @@
           <a:p>
             <a:fld id="{2E994A1B-9EC8-443E-AB50-093F978C17CC}" type="slidenum">
               <a:rPr lang="pt-BR" smtClean="0"/>
+              <a:pPr/>
               <a:t>‹nº›</a:t>
             </a:fld>
             <a:endParaRPr lang="pt-BR"/>
@@ -2668,6 +2689,7 @@
           <a:p>
             <a:fld id="{DFFEC6BA-A1B7-45A9-A497-036820647F43}" type="datetimeFigureOut">
               <a:rPr lang="pt-BR" smtClean="0"/>
+              <a:pPr/>
               <a:t>20/06/2014</a:t>
             </a:fld>
             <a:endParaRPr lang="pt-BR"/>
@@ -2746,6 +2768,7 @@
           <a:p>
             <a:fld id="{2E994A1B-9EC8-443E-AB50-093F978C17CC}" type="slidenum">
               <a:rPr lang="pt-BR" smtClean="0"/>
+              <a:pPr/>
               <a:t>‹nº›</a:t>
             </a:fld>
             <a:endParaRPr lang="pt-BR"/>
@@ -3551,11 +3574,7 @@
             </a:r>
             <a:r>
               <a:rPr lang="en-US" sz="1800" dirty="0" smtClean="0"/>
-              <a:t>nnecessary files </a:t>
-            </a:r>
-            <a:r>
-              <a:rPr lang="en-US" sz="1800" dirty="0" smtClean="0"/>
-              <a:t>were deleted from </a:t>
+              <a:t>nnecessary files were deleted from </a:t>
             </a:r>
             <a:r>
               <a:rPr lang="en-US" sz="1800" dirty="0"/>
@@ -3598,16 +3617,21 @@
           <a:p>
             <a:r>
               <a:rPr lang="en-US" sz="1800" dirty="0" smtClean="0"/>
-              <a:t>Investigation was made  on needed structures for correct work of persistent </a:t>
-            </a:r>
-            <a:r>
-              <a:rPr lang="en-US" sz="1800" dirty="0" err="1" smtClean="0"/>
-              <a:t>orthogonality</a:t>
+              <a:t>Investigation was made  on needed structures for correct work </a:t>
+            </a:r>
+            <a:r>
+              <a:rPr lang="en-US" sz="1800" dirty="0" smtClean="0"/>
+              <a:t>of </a:t>
+            </a:r>
+            <a:r>
+              <a:rPr lang="en-US" sz="1800" dirty="0" smtClean="0"/>
+              <a:t>orthogonal persistence</a:t>
             </a:r>
             <a:r>
               <a:rPr lang="en-US" sz="1800" dirty="0" smtClean="0"/>
               <a:t>.</a:t>
             </a:r>
+            <a:endParaRPr lang="en-US" sz="1800" dirty="0" smtClean="0"/>
           </a:p>
           <a:p>
             <a:endParaRPr lang="en-US" sz="1800" dirty="0"/>
@@ -3615,15 +3639,7 @@
           <a:p>
             <a:r>
               <a:rPr lang="en-US" sz="1800" dirty="0" smtClean="0"/>
-              <a:t>Unit tests were created for heap file and UTF-8 hash </a:t>
-            </a:r>
-            <a:r>
-              <a:rPr lang="en-US" sz="1800" smtClean="0"/>
-              <a:t>table file </a:t>
-            </a:r>
-            <a:r>
-              <a:rPr lang="en-US" sz="1800" dirty="0" smtClean="0"/>
-              <a:t>creation.</a:t>
+              <a:t>Unit tests were created for heap file and UTF-8 hash table file creation.</a:t>
             </a:r>
           </a:p>
           <a:p>
@@ -3634,69 +3650,6 @@
           </a:p>
           <a:p>
             <a:endParaRPr lang="pt-BR" dirty="0" smtClean="0"/>
-          </a:p>
-        </p:txBody>
-      </p:sp>
-    </p:spTree>
-  </p:cSld>
-  <p:clrMapOvr>
-    <a:masterClrMapping/>
-  </p:clrMapOvr>
-</p:sld>
-</file>
-
-<file path=ppt/slides/slide4.xml><?xml version="1.0" encoding="utf-8"?>
-<p:sld xmlns:a="http://schemas.openxmlformats.org/drawingml/2006/main" xmlns:r="http://schemas.openxmlformats.org/officeDocument/2006/relationships" xmlns:p="http://schemas.openxmlformats.org/presentationml/2006/main">
-  <p:cSld>
-    <p:spTree>
-      <p:nvGrpSpPr>
-        <p:cNvPr id="1" name=""/>
-        <p:cNvGrpSpPr/>
-        <p:nvPr/>
-      </p:nvGrpSpPr>
-      <p:grpSpPr>
-        <a:xfrm>
-          <a:off x="0" y="0"/>
-          <a:ext cx="0" cy="0"/>
-          <a:chOff x="0" y="0"/>
-          <a:chExt cx="0" cy="0"/>
-        </a:xfrm>
-      </p:grpSpPr>
-      <p:sp>
-        <p:nvSpPr>
-          <p:cNvPr id="2" name="Título 1"/>
-          <p:cNvSpPr>
-            <a:spLocks noGrp="1"/>
-          </p:cNvSpPr>
-          <p:nvPr>
-            <p:ph type="title"/>
-          </p:nvPr>
-        </p:nvSpPr>
-        <p:spPr/>
-        <p:txBody>
-          <a:bodyPr/>
-          <a:lstStyle/>
-          <a:p>
-            <a:endParaRPr lang="pt-BR" dirty="0"/>
-          </a:p>
-        </p:txBody>
-      </p:sp>
-      <p:sp>
-        <p:nvSpPr>
-          <p:cNvPr id="3" name="Espaço Reservado para Conteúdo 2"/>
-          <p:cNvSpPr>
-            <a:spLocks noGrp="1"/>
-          </p:cNvSpPr>
-          <p:nvPr>
-            <p:ph idx="1"/>
-          </p:nvPr>
-        </p:nvSpPr>
-        <p:spPr/>
-        <p:txBody>
-          <a:bodyPr/>
-          <a:lstStyle/>
-          <a:p>
-            <a:endParaRPr lang="pt-BR"/>
           </a:p>
         </p:txBody>
       </p:sp>

</xml_diff>